<commit_message>
Revisões ok, falta exemplos
</commit_message>
<xml_diff>
--- a/PromotingSoftwareReuseWithRAS/Desenhos.pptx
+++ b/PromotingSoftwareReuseWithRAS/Desenhos.pptx
@@ -8,6 +8,7 @@
     <p:sldId id="256" r:id="rId2"/>
     <p:sldId id="257" r:id="rId3"/>
     <p:sldId id="258" r:id="rId4"/>
+    <p:sldId id="259" r:id="rId5"/>
   </p:sldIdLst>
   <p:sldSz cx="9144000" cy="6858000" type="screen4x3"/>
   <p:notesSz cx="6858000" cy="9144000"/>
@@ -2103,7 +2104,7 @@
   <dgm:whole/>
   <dgm:extLst>
     <a:ext uri="http://schemas.microsoft.com/office/drawing/2008/diagram">
-      <dsp:dataModelExt xmlns:dsp="http://schemas.microsoft.com/office/drawing/2008/diagram" xmlns="" relId="rId6" minVer="http://schemas.openxmlformats.org/drawingml/2006/diagram"/>
+      <dsp:dataModelExt xmlns="" xmlns:dsp="http://schemas.microsoft.com/office/drawing/2008/diagram" relId="rId6" minVer="http://schemas.openxmlformats.org/drawingml/2006/diagram"/>
     </a:ext>
   </dgm:extLst>
 </dgm:dataModel>
@@ -2353,7 +2354,7 @@
   <dgm:whole/>
   <dgm:extLst>
     <a:ext uri="http://schemas.microsoft.com/office/drawing/2008/diagram">
-      <dsp:dataModelExt xmlns:dsp="http://schemas.microsoft.com/office/drawing/2008/diagram" xmlns="" relId="rId11" minVer="http://schemas.openxmlformats.org/drawingml/2006/diagram"/>
+      <dsp:dataModelExt xmlns="" xmlns:dsp="http://schemas.microsoft.com/office/drawing/2008/diagram" relId="rId11" minVer="http://schemas.openxmlformats.org/drawingml/2006/diagram"/>
     </a:ext>
   </dgm:extLst>
 </dgm:dataModel>
@@ -5783,7 +5784,7 @@
             <a:fld id="{A7B42A40-B707-4983-807D-17011D490F87}" type="datetimeFigureOut">
               <a:rPr lang="pt-BR" smtClean="0"/>
               <a:pPr/>
-              <a:t>21/06/2009</a:t>
+              <a:t>22/06/2009</a:t>
             </a:fld>
             <a:endParaRPr lang="pt-BR"/>
           </a:p>
@@ -5826,7 +5827,7 @@
             <a:fld id="{E545FD62-2F7E-4843-A4AD-0212DEDA2940}" type="slidenum">
               <a:rPr lang="pt-BR" smtClean="0"/>
               <a:pPr/>
-              <a:t>‹nº›</a:t>
+              <a:t>‹#›</a:t>
             </a:fld>
             <a:endParaRPr lang="pt-BR"/>
           </a:p>
@@ -5950,7 +5951,7 @@
             <a:fld id="{A7B42A40-B707-4983-807D-17011D490F87}" type="datetimeFigureOut">
               <a:rPr lang="pt-BR" smtClean="0"/>
               <a:pPr/>
-              <a:t>21/06/2009</a:t>
+              <a:t>22/06/2009</a:t>
             </a:fld>
             <a:endParaRPr lang="pt-BR"/>
           </a:p>
@@ -5993,7 +5994,7 @@
             <a:fld id="{E545FD62-2F7E-4843-A4AD-0212DEDA2940}" type="slidenum">
               <a:rPr lang="pt-BR" smtClean="0"/>
               <a:pPr/>
-              <a:t>‹nº›</a:t>
+              <a:t>‹#›</a:t>
             </a:fld>
             <a:endParaRPr lang="pt-BR"/>
           </a:p>
@@ -6127,7 +6128,7 @@
             <a:fld id="{A7B42A40-B707-4983-807D-17011D490F87}" type="datetimeFigureOut">
               <a:rPr lang="pt-BR" smtClean="0"/>
               <a:pPr/>
-              <a:t>21/06/2009</a:t>
+              <a:t>22/06/2009</a:t>
             </a:fld>
             <a:endParaRPr lang="pt-BR"/>
           </a:p>
@@ -6170,7 +6171,7 @@
             <a:fld id="{E545FD62-2F7E-4843-A4AD-0212DEDA2940}" type="slidenum">
               <a:rPr lang="pt-BR" smtClean="0"/>
               <a:pPr/>
-              <a:t>‹nº›</a:t>
+              <a:t>‹#›</a:t>
             </a:fld>
             <a:endParaRPr lang="pt-BR"/>
           </a:p>
@@ -6294,7 +6295,7 @@
             <a:fld id="{A7B42A40-B707-4983-807D-17011D490F87}" type="datetimeFigureOut">
               <a:rPr lang="pt-BR" smtClean="0"/>
               <a:pPr/>
-              <a:t>21/06/2009</a:t>
+              <a:t>22/06/2009</a:t>
             </a:fld>
             <a:endParaRPr lang="pt-BR"/>
           </a:p>
@@ -6337,7 +6338,7 @@
             <a:fld id="{E545FD62-2F7E-4843-A4AD-0212DEDA2940}" type="slidenum">
               <a:rPr lang="pt-BR" smtClean="0"/>
               <a:pPr/>
-              <a:t>‹nº›</a:t>
+              <a:t>‹#›</a:t>
             </a:fld>
             <a:endParaRPr lang="pt-BR"/>
           </a:p>
@@ -6537,7 +6538,7 @@
             <a:fld id="{A7B42A40-B707-4983-807D-17011D490F87}" type="datetimeFigureOut">
               <a:rPr lang="pt-BR" smtClean="0"/>
               <a:pPr/>
-              <a:t>21/06/2009</a:t>
+              <a:t>22/06/2009</a:t>
             </a:fld>
             <a:endParaRPr lang="pt-BR"/>
           </a:p>
@@ -6580,7 +6581,7 @@
             <a:fld id="{E545FD62-2F7E-4843-A4AD-0212DEDA2940}" type="slidenum">
               <a:rPr lang="pt-BR" smtClean="0"/>
               <a:pPr/>
-              <a:t>‹nº›</a:t>
+              <a:t>‹#›</a:t>
             </a:fld>
             <a:endParaRPr lang="pt-BR"/>
           </a:p>
@@ -6822,7 +6823,7 @@
             <a:fld id="{A7B42A40-B707-4983-807D-17011D490F87}" type="datetimeFigureOut">
               <a:rPr lang="pt-BR" smtClean="0"/>
               <a:pPr/>
-              <a:t>21/06/2009</a:t>
+              <a:t>22/06/2009</a:t>
             </a:fld>
             <a:endParaRPr lang="pt-BR"/>
           </a:p>
@@ -6865,7 +6866,7 @@
             <a:fld id="{E545FD62-2F7E-4843-A4AD-0212DEDA2940}" type="slidenum">
               <a:rPr lang="pt-BR" smtClean="0"/>
               <a:pPr/>
-              <a:t>‹nº›</a:t>
+              <a:t>‹#›</a:t>
             </a:fld>
             <a:endParaRPr lang="pt-BR"/>
           </a:p>
@@ -7241,7 +7242,7 @@
             <a:fld id="{A7B42A40-B707-4983-807D-17011D490F87}" type="datetimeFigureOut">
               <a:rPr lang="pt-BR" smtClean="0"/>
               <a:pPr/>
-              <a:t>21/06/2009</a:t>
+              <a:t>22/06/2009</a:t>
             </a:fld>
             <a:endParaRPr lang="pt-BR"/>
           </a:p>
@@ -7284,7 +7285,7 @@
             <a:fld id="{E545FD62-2F7E-4843-A4AD-0212DEDA2940}" type="slidenum">
               <a:rPr lang="pt-BR" smtClean="0"/>
               <a:pPr/>
-              <a:t>‹nº›</a:t>
+              <a:t>‹#›</a:t>
             </a:fld>
             <a:endParaRPr lang="pt-BR"/>
           </a:p>
@@ -7356,7 +7357,7 @@
             <a:fld id="{A7B42A40-B707-4983-807D-17011D490F87}" type="datetimeFigureOut">
               <a:rPr lang="pt-BR" smtClean="0"/>
               <a:pPr/>
-              <a:t>21/06/2009</a:t>
+              <a:t>22/06/2009</a:t>
             </a:fld>
             <a:endParaRPr lang="pt-BR"/>
           </a:p>
@@ -7399,7 +7400,7 @@
             <a:fld id="{E545FD62-2F7E-4843-A4AD-0212DEDA2940}" type="slidenum">
               <a:rPr lang="pt-BR" smtClean="0"/>
               <a:pPr/>
-              <a:t>‹nº›</a:t>
+              <a:t>‹#›</a:t>
             </a:fld>
             <a:endParaRPr lang="pt-BR"/>
           </a:p>
@@ -7448,7 +7449,7 @@
             <a:fld id="{A7B42A40-B707-4983-807D-17011D490F87}" type="datetimeFigureOut">
               <a:rPr lang="pt-BR" smtClean="0"/>
               <a:pPr/>
-              <a:t>21/06/2009</a:t>
+              <a:t>22/06/2009</a:t>
             </a:fld>
             <a:endParaRPr lang="pt-BR"/>
           </a:p>
@@ -7491,7 +7492,7 @@
             <a:fld id="{E545FD62-2F7E-4843-A4AD-0212DEDA2940}" type="slidenum">
               <a:rPr lang="pt-BR" smtClean="0"/>
               <a:pPr/>
-              <a:t>‹nº›</a:t>
+              <a:t>‹#›</a:t>
             </a:fld>
             <a:endParaRPr lang="pt-BR"/>
           </a:p>
@@ -7722,7 +7723,7 @@
             <a:fld id="{A7B42A40-B707-4983-807D-17011D490F87}" type="datetimeFigureOut">
               <a:rPr lang="pt-BR" smtClean="0"/>
               <a:pPr/>
-              <a:t>21/06/2009</a:t>
+              <a:t>22/06/2009</a:t>
             </a:fld>
             <a:endParaRPr lang="pt-BR"/>
           </a:p>
@@ -7765,7 +7766,7 @@
             <a:fld id="{E545FD62-2F7E-4843-A4AD-0212DEDA2940}" type="slidenum">
               <a:rPr lang="pt-BR" smtClean="0"/>
               <a:pPr/>
-              <a:t>‹nº›</a:t>
+              <a:t>‹#›</a:t>
             </a:fld>
             <a:endParaRPr lang="pt-BR"/>
           </a:p>
@@ -7972,7 +7973,7 @@
             <a:fld id="{A7B42A40-B707-4983-807D-17011D490F87}" type="datetimeFigureOut">
               <a:rPr lang="pt-BR" smtClean="0"/>
               <a:pPr/>
-              <a:t>21/06/2009</a:t>
+              <a:t>22/06/2009</a:t>
             </a:fld>
             <a:endParaRPr lang="pt-BR"/>
           </a:p>
@@ -8015,7 +8016,7 @@
             <a:fld id="{E545FD62-2F7E-4843-A4AD-0212DEDA2940}" type="slidenum">
               <a:rPr lang="pt-BR" smtClean="0"/>
               <a:pPr/>
-              <a:t>‹nº›</a:t>
+              <a:t>‹#›</a:t>
             </a:fld>
             <a:endParaRPr lang="pt-BR"/>
           </a:p>
@@ -8182,7 +8183,7 @@
             <a:fld id="{A7B42A40-B707-4983-807D-17011D490F87}" type="datetimeFigureOut">
               <a:rPr lang="pt-BR" smtClean="0"/>
               <a:pPr/>
-              <a:t>21/06/2009</a:t>
+              <a:t>22/06/2009</a:t>
             </a:fld>
             <a:endParaRPr lang="pt-BR"/>
           </a:p>
@@ -8261,7 +8262,7 @@
             <a:fld id="{E545FD62-2F7E-4843-A4AD-0212DEDA2940}" type="slidenum">
               <a:rPr lang="pt-BR" smtClean="0"/>
               <a:pPr/>
-              <a:t>‹nº›</a:t>
+              <a:t>‹#›</a:t>
             </a:fld>
             <a:endParaRPr lang="pt-BR"/>
           </a:p>
@@ -8681,7 +8682,7 @@
         </p:xfrm>
         <a:graphic>
           <a:graphicData uri="http://schemas.openxmlformats.org/drawingml/2006/diagram">
-            <dgm:relIds xmlns:dgm="http://schemas.openxmlformats.org/drawingml/2006/diagram" xmlns:r="http://schemas.openxmlformats.org/officeDocument/2006/relationships" r:dm="rId7" r:lo="rId8" r:qs="rId9" r:cs="rId10"/>
+            <dgm:relIds xmlns:dgm="http://schemas.openxmlformats.org/drawingml/2006/diagram" xmlns:r="http://schemas.openxmlformats.org/officeDocument/2006/relationships" r:dm="rId6" r:lo="rId7" r:qs="rId8" r:cs="rId9"/>
           </a:graphicData>
         </a:graphic>
       </p:graphicFrame>
@@ -9970,6 +9971,409 @@
 </p:sld>
 </file>
 
+<file path=ppt/slides/slide4.xml><?xml version="1.0" encoding="utf-8"?>
+<p:sld xmlns:a="http://schemas.openxmlformats.org/drawingml/2006/main" xmlns:r="http://schemas.openxmlformats.org/officeDocument/2006/relationships" xmlns:p="http://schemas.openxmlformats.org/presentationml/2006/main">
+  <p:cSld>
+    <p:spTree>
+      <p:nvGrpSpPr>
+        <p:cNvPr id="1" name=""/>
+        <p:cNvGrpSpPr/>
+        <p:nvPr/>
+      </p:nvGrpSpPr>
+      <p:grpSpPr>
+        <a:xfrm>
+          <a:off x="0" y="0"/>
+          <a:ext cx="0" cy="0"/>
+          <a:chOff x="0" y="0"/>
+          <a:chExt cx="0" cy="0"/>
+        </a:xfrm>
+      </p:grpSpPr>
+      <p:sp>
+        <p:nvSpPr>
+          <p:cNvPr id="2" name="Rounded Rectangle 1"/>
+          <p:cNvSpPr/>
+          <p:nvPr/>
+        </p:nvSpPr>
+        <p:spPr>
+          <a:xfrm flipH="1">
+            <a:off x="1190621" y="1805940"/>
+            <a:ext cx="6648453" cy="755904"/>
+          </a:xfrm>
+          <a:prstGeom prst="roundRect">
+            <a:avLst/>
+          </a:prstGeom>
+        </p:spPr>
+        <p:style>
+          <a:lnRef idx="0">
+            <a:schemeClr val="accent1"/>
+          </a:lnRef>
+          <a:fillRef idx="3">
+            <a:schemeClr val="accent1"/>
+          </a:fillRef>
+          <a:effectRef idx="3">
+            <a:schemeClr val="accent1"/>
+          </a:effectRef>
+          <a:fontRef idx="minor">
+            <a:schemeClr val="lt1"/>
+          </a:fontRef>
+        </p:style>
+        <p:txBody>
+          <a:bodyPr rtlCol="0" anchor="ctr"/>
+          <a:lstStyle/>
+          <a:p>
+            <a:pPr algn="ctr"/>
+            <a:r>
+              <a:rPr lang="pt-BR" dirty="0" smtClean="0"/>
+              <a:t>Archiva</a:t>
+            </a:r>
+            <a:endParaRPr lang="pt-BR" dirty="0"/>
+          </a:p>
+        </p:txBody>
+      </p:sp>
+      <p:sp>
+        <p:nvSpPr>
+          <p:cNvPr id="5" name="Rounded Rectangle 4"/>
+          <p:cNvSpPr/>
+          <p:nvPr/>
+        </p:nvSpPr>
+        <p:spPr>
+          <a:xfrm>
+            <a:off x="6021705" y="2622613"/>
+            <a:ext cx="1827096" cy="1440000"/>
+          </a:xfrm>
+          <a:prstGeom prst="roundRect">
+            <a:avLst/>
+          </a:prstGeom>
+        </p:spPr>
+        <p:style>
+          <a:lnRef idx="0">
+            <a:schemeClr val="accent3"/>
+          </a:lnRef>
+          <a:fillRef idx="3">
+            <a:schemeClr val="accent3"/>
+          </a:fillRef>
+          <a:effectRef idx="3">
+            <a:schemeClr val="accent3"/>
+          </a:effectRef>
+          <a:fontRef idx="minor">
+            <a:schemeClr val="lt1"/>
+          </a:fontRef>
+        </p:style>
+        <p:txBody>
+          <a:bodyPr rtlCol="0" anchor="ctr"/>
+          <a:lstStyle/>
+          <a:p>
+            <a:pPr algn="ctr"/>
+            <a:r>
+              <a:rPr lang="pt-BR" dirty="0" smtClean="0"/>
+              <a:t>Consumidor de Conteúdo de Repositório</a:t>
+            </a:r>
+            <a:endParaRPr lang="pt-BR" dirty="0"/>
+          </a:p>
+        </p:txBody>
+      </p:sp>
+      <p:sp>
+        <p:nvSpPr>
+          <p:cNvPr id="3" name="Flowchart: Magnetic Disk 2"/>
+          <p:cNvSpPr/>
+          <p:nvPr/>
+        </p:nvSpPr>
+        <p:spPr>
+          <a:xfrm>
+            <a:off x="2916936" y="2622613"/>
+            <a:ext cx="1440000" cy="1440000"/>
+          </a:xfrm>
+          <a:prstGeom prst="flowChartMagneticDisk">
+            <a:avLst/>
+          </a:prstGeom>
+        </p:spPr>
+        <p:style>
+          <a:lnRef idx="0">
+            <a:schemeClr val="accent3"/>
+          </a:lnRef>
+          <a:fillRef idx="3">
+            <a:schemeClr val="accent3"/>
+          </a:fillRef>
+          <a:effectRef idx="3">
+            <a:schemeClr val="accent3"/>
+          </a:effectRef>
+          <a:fontRef idx="minor">
+            <a:schemeClr val="lt1"/>
+          </a:fontRef>
+        </p:style>
+        <p:txBody>
+          <a:bodyPr rtlCol="0" anchor="ctr"/>
+          <a:lstStyle/>
+          <a:p>
+            <a:pPr algn="ctr"/>
+            <a:r>
+              <a:rPr lang="pt-BR" dirty="0" smtClean="0"/>
+              <a:t>Repositório</a:t>
+            </a:r>
+            <a:endParaRPr lang="pt-BR" dirty="0"/>
+          </a:p>
+        </p:txBody>
+      </p:sp>
+      <p:sp>
+        <p:nvSpPr>
+          <p:cNvPr id="8" name="Striped Right Arrow 7"/>
+          <p:cNvSpPr/>
+          <p:nvPr/>
+        </p:nvSpPr>
+        <p:spPr>
+          <a:xfrm>
+            <a:off x="1256538" y="2818357"/>
+            <a:ext cx="1609344" cy="1048512"/>
+          </a:xfrm>
+          <a:prstGeom prst="stripedRightArrow">
+            <a:avLst/>
+          </a:prstGeom>
+        </p:spPr>
+        <p:style>
+          <a:lnRef idx="0">
+            <a:schemeClr val="accent3"/>
+          </a:lnRef>
+          <a:fillRef idx="3">
+            <a:schemeClr val="accent3"/>
+          </a:fillRef>
+          <a:effectRef idx="3">
+            <a:schemeClr val="accent3"/>
+          </a:effectRef>
+          <a:fontRef idx="minor">
+            <a:schemeClr val="lt1"/>
+          </a:fontRef>
+        </p:style>
+        <p:txBody>
+          <a:bodyPr rtlCol="0" anchor="ctr"/>
+          <a:lstStyle/>
+          <a:p>
+            <a:pPr algn="ctr"/>
+            <a:r>
+              <a:rPr lang="pt-BR" dirty="0" smtClean="0"/>
+              <a:t>Varredura</a:t>
+            </a:r>
+            <a:endParaRPr lang="pt-BR" dirty="0"/>
+          </a:p>
+        </p:txBody>
+      </p:sp>
+      <p:sp>
+        <p:nvSpPr>
+          <p:cNvPr id="11" name="Right Arrow 10"/>
+          <p:cNvSpPr/>
+          <p:nvPr/>
+        </p:nvSpPr>
+        <p:spPr>
+          <a:xfrm>
+            <a:off x="4448175" y="2817595"/>
+            <a:ext cx="1475232" cy="1050036"/>
+          </a:xfrm>
+          <a:prstGeom prst="rightArrow">
+            <a:avLst/>
+          </a:prstGeom>
+        </p:spPr>
+        <p:style>
+          <a:lnRef idx="0">
+            <a:schemeClr val="accent3"/>
+          </a:lnRef>
+          <a:fillRef idx="3">
+            <a:schemeClr val="accent3"/>
+          </a:fillRef>
+          <a:effectRef idx="3">
+            <a:schemeClr val="accent3"/>
+          </a:effectRef>
+          <a:fontRef idx="minor">
+            <a:schemeClr val="lt1"/>
+          </a:fontRef>
+        </p:style>
+        <p:txBody>
+          <a:bodyPr rtlCol="0" anchor="ctr"/>
+          <a:lstStyle/>
+          <a:p>
+            <a:pPr algn="ctr"/>
+            <a:r>
+              <a:rPr lang="pt-BR" dirty="0" smtClean="0"/>
+              <a:t>Artefato</a:t>
+            </a:r>
+            <a:endParaRPr lang="pt-BR" dirty="0"/>
+          </a:p>
+        </p:txBody>
+      </p:sp>
+      <p:sp>
+        <p:nvSpPr>
+          <p:cNvPr id="13" name="Rounded Rectangle 12"/>
+          <p:cNvSpPr/>
+          <p:nvPr/>
+        </p:nvSpPr>
+        <p:spPr>
+          <a:xfrm>
+            <a:off x="6021705" y="4118038"/>
+            <a:ext cx="1827096" cy="1440000"/>
+          </a:xfrm>
+          <a:prstGeom prst="roundRect">
+            <a:avLst/>
+          </a:prstGeom>
+        </p:spPr>
+        <p:style>
+          <a:lnRef idx="0">
+            <a:schemeClr val="accent2"/>
+          </a:lnRef>
+          <a:fillRef idx="3">
+            <a:schemeClr val="accent2"/>
+          </a:fillRef>
+          <a:effectRef idx="3">
+            <a:schemeClr val="accent2"/>
+          </a:effectRef>
+          <a:fontRef idx="minor">
+            <a:schemeClr val="lt1"/>
+          </a:fontRef>
+        </p:style>
+        <p:txBody>
+          <a:bodyPr rtlCol="0" anchor="ctr"/>
+          <a:lstStyle/>
+          <a:p>
+            <a:pPr algn="ctr"/>
+            <a:r>
+              <a:rPr lang="pt-BR" dirty="0" smtClean="0"/>
+              <a:t>Consumidor de Base de Dados</a:t>
+            </a:r>
+            <a:endParaRPr lang="pt-BR" dirty="0"/>
+          </a:p>
+        </p:txBody>
+      </p:sp>
+      <p:sp>
+        <p:nvSpPr>
+          <p:cNvPr id="14" name="Flowchart: Magnetic Disk 13"/>
+          <p:cNvSpPr/>
+          <p:nvPr/>
+        </p:nvSpPr>
+        <p:spPr>
+          <a:xfrm>
+            <a:off x="2916936" y="4118038"/>
+            <a:ext cx="1440000" cy="1440000"/>
+          </a:xfrm>
+          <a:prstGeom prst="flowChartMagneticDisk">
+            <a:avLst/>
+          </a:prstGeom>
+        </p:spPr>
+        <p:style>
+          <a:lnRef idx="0">
+            <a:schemeClr val="accent2"/>
+          </a:lnRef>
+          <a:fillRef idx="3">
+            <a:schemeClr val="accent2"/>
+          </a:fillRef>
+          <a:effectRef idx="3">
+            <a:schemeClr val="accent2"/>
+          </a:effectRef>
+          <a:fontRef idx="minor">
+            <a:schemeClr val="lt1"/>
+          </a:fontRef>
+        </p:style>
+        <p:txBody>
+          <a:bodyPr rtlCol="0" anchor="ctr"/>
+          <a:lstStyle/>
+          <a:p>
+            <a:pPr algn="ctr"/>
+            <a:r>
+              <a:rPr lang="pt-BR" dirty="0" smtClean="0"/>
+              <a:t>Base de Dados</a:t>
+            </a:r>
+            <a:endParaRPr lang="pt-BR" dirty="0"/>
+          </a:p>
+        </p:txBody>
+      </p:sp>
+      <p:sp>
+        <p:nvSpPr>
+          <p:cNvPr id="15" name="Striped Right Arrow 14"/>
+          <p:cNvSpPr/>
+          <p:nvPr/>
+        </p:nvSpPr>
+        <p:spPr>
+          <a:xfrm>
+            <a:off x="1256538" y="4313782"/>
+            <a:ext cx="1609344" cy="1048512"/>
+          </a:xfrm>
+          <a:prstGeom prst="stripedRightArrow">
+            <a:avLst/>
+          </a:prstGeom>
+        </p:spPr>
+        <p:style>
+          <a:lnRef idx="0">
+            <a:schemeClr val="accent2"/>
+          </a:lnRef>
+          <a:fillRef idx="3">
+            <a:schemeClr val="accent2"/>
+          </a:fillRef>
+          <a:effectRef idx="3">
+            <a:schemeClr val="accent2"/>
+          </a:effectRef>
+          <a:fontRef idx="minor">
+            <a:schemeClr val="lt1"/>
+          </a:fontRef>
+        </p:style>
+        <p:txBody>
+          <a:bodyPr rtlCol="0" anchor="ctr"/>
+          <a:lstStyle/>
+          <a:p>
+            <a:pPr algn="ctr"/>
+            <a:r>
+              <a:rPr lang="pt-BR" dirty="0" smtClean="0"/>
+              <a:t>Varredura</a:t>
+            </a:r>
+            <a:endParaRPr lang="pt-BR" dirty="0"/>
+          </a:p>
+        </p:txBody>
+      </p:sp>
+      <p:sp>
+        <p:nvSpPr>
+          <p:cNvPr id="16" name="Right Arrow 15"/>
+          <p:cNvSpPr/>
+          <p:nvPr/>
+        </p:nvSpPr>
+        <p:spPr>
+          <a:xfrm>
+            <a:off x="4448175" y="4313020"/>
+            <a:ext cx="1475232" cy="1050036"/>
+          </a:xfrm>
+          <a:prstGeom prst="rightArrow">
+            <a:avLst/>
+          </a:prstGeom>
+        </p:spPr>
+        <p:style>
+          <a:lnRef idx="0">
+            <a:schemeClr val="accent2"/>
+          </a:lnRef>
+          <a:fillRef idx="3">
+            <a:schemeClr val="accent2"/>
+          </a:fillRef>
+          <a:effectRef idx="3">
+            <a:schemeClr val="accent2"/>
+          </a:effectRef>
+          <a:fontRef idx="minor">
+            <a:schemeClr val="lt1"/>
+          </a:fontRef>
+        </p:style>
+        <p:txBody>
+          <a:bodyPr rtlCol="0" anchor="ctr"/>
+          <a:lstStyle/>
+          <a:p>
+            <a:pPr algn="ctr"/>
+            <a:r>
+              <a:rPr lang="pt-BR" dirty="0" smtClean="0"/>
+              <a:t>Artefato</a:t>
+            </a:r>
+            <a:endParaRPr lang="pt-BR" dirty="0"/>
+          </a:p>
+        </p:txBody>
+      </p:sp>
+    </p:spTree>
+  </p:cSld>
+  <p:clrMapOvr>
+    <a:masterClrMapping/>
+  </p:clrMapOvr>
+</p:sld>
+</file>
+
 <file path=ppt/theme/theme1.xml><?xml version="1.0" encoding="utf-8"?>
 <a:theme xmlns:a="http://schemas.openxmlformats.org/drawingml/2006/main" name="Tema do Office">
   <a:themeElements>

</xml_diff>